<commit_message>
Load xml file using Stream, show setting data, save setting data using stream
Signed-off-by: cuonghv2010 <cuonghv201095@gmail.com>
</commit_message>
<xml_diff>
--- a/basic/xmlSettingFile/readme.pptx
+++ b/basic/xmlSettingFile/readme.pptx
@@ -262,7 +262,7 @@
           <a:p>
             <a:fld id="{E367C172-55BE-4236-9969-D03914048A1F}" type="datetimeFigureOut">
               <a:rPr kumimoji="1" lang="ja-JP" altLang="en-US" smtClean="0"/>
-              <a:t>2023/1/6</a:t>
+              <a:t>2023/1/7</a:t>
             </a:fld>
             <a:endParaRPr kumimoji="1" lang="ja-JP" altLang="en-US"/>
           </a:p>
@@ -462,7 +462,7 @@
           <a:p>
             <a:fld id="{E367C172-55BE-4236-9969-D03914048A1F}" type="datetimeFigureOut">
               <a:rPr kumimoji="1" lang="ja-JP" altLang="en-US" smtClean="0"/>
-              <a:t>2023/1/6</a:t>
+              <a:t>2023/1/7</a:t>
             </a:fld>
             <a:endParaRPr kumimoji="1" lang="ja-JP" altLang="en-US"/>
           </a:p>
@@ -672,7 +672,7 @@
           <a:p>
             <a:fld id="{E367C172-55BE-4236-9969-D03914048A1F}" type="datetimeFigureOut">
               <a:rPr kumimoji="1" lang="ja-JP" altLang="en-US" smtClean="0"/>
-              <a:t>2023/1/6</a:t>
+              <a:t>2023/1/7</a:t>
             </a:fld>
             <a:endParaRPr kumimoji="1" lang="ja-JP" altLang="en-US"/>
           </a:p>
@@ -872,7 +872,7 @@
           <a:p>
             <a:fld id="{E367C172-55BE-4236-9969-D03914048A1F}" type="datetimeFigureOut">
               <a:rPr kumimoji="1" lang="ja-JP" altLang="en-US" smtClean="0"/>
-              <a:t>2023/1/6</a:t>
+              <a:t>2023/1/7</a:t>
             </a:fld>
             <a:endParaRPr kumimoji="1" lang="ja-JP" altLang="en-US"/>
           </a:p>
@@ -1148,7 +1148,7 @@
           <a:p>
             <a:fld id="{E367C172-55BE-4236-9969-D03914048A1F}" type="datetimeFigureOut">
               <a:rPr kumimoji="1" lang="ja-JP" altLang="en-US" smtClean="0"/>
-              <a:t>2023/1/6</a:t>
+              <a:t>2023/1/7</a:t>
             </a:fld>
             <a:endParaRPr kumimoji="1" lang="ja-JP" altLang="en-US"/>
           </a:p>
@@ -1416,7 +1416,7 @@
           <a:p>
             <a:fld id="{E367C172-55BE-4236-9969-D03914048A1F}" type="datetimeFigureOut">
               <a:rPr kumimoji="1" lang="ja-JP" altLang="en-US" smtClean="0"/>
-              <a:t>2023/1/6</a:t>
+              <a:t>2023/1/7</a:t>
             </a:fld>
             <a:endParaRPr kumimoji="1" lang="ja-JP" altLang="en-US"/>
           </a:p>
@@ -1831,7 +1831,7 @@
           <a:p>
             <a:fld id="{E367C172-55BE-4236-9969-D03914048A1F}" type="datetimeFigureOut">
               <a:rPr kumimoji="1" lang="ja-JP" altLang="en-US" smtClean="0"/>
-              <a:t>2023/1/6</a:t>
+              <a:t>2023/1/7</a:t>
             </a:fld>
             <a:endParaRPr kumimoji="1" lang="ja-JP" altLang="en-US"/>
           </a:p>
@@ -1973,7 +1973,7 @@
           <a:p>
             <a:fld id="{E367C172-55BE-4236-9969-D03914048A1F}" type="datetimeFigureOut">
               <a:rPr kumimoji="1" lang="ja-JP" altLang="en-US" smtClean="0"/>
-              <a:t>2023/1/6</a:t>
+              <a:t>2023/1/7</a:t>
             </a:fld>
             <a:endParaRPr kumimoji="1" lang="ja-JP" altLang="en-US"/>
           </a:p>
@@ -2086,7 +2086,7 @@
           <a:p>
             <a:fld id="{E367C172-55BE-4236-9969-D03914048A1F}" type="datetimeFigureOut">
               <a:rPr kumimoji="1" lang="ja-JP" altLang="en-US" smtClean="0"/>
-              <a:t>2023/1/6</a:t>
+              <a:t>2023/1/7</a:t>
             </a:fld>
             <a:endParaRPr kumimoji="1" lang="ja-JP" altLang="en-US"/>
           </a:p>
@@ -2399,7 +2399,7 @@
           <a:p>
             <a:fld id="{E367C172-55BE-4236-9969-D03914048A1F}" type="datetimeFigureOut">
               <a:rPr kumimoji="1" lang="ja-JP" altLang="en-US" smtClean="0"/>
-              <a:t>2023/1/6</a:t>
+              <a:t>2023/1/7</a:t>
             </a:fld>
             <a:endParaRPr kumimoji="1" lang="ja-JP" altLang="en-US"/>
           </a:p>
@@ -2688,7 +2688,7 @@
           <a:p>
             <a:fld id="{E367C172-55BE-4236-9969-D03914048A1F}" type="datetimeFigureOut">
               <a:rPr kumimoji="1" lang="ja-JP" altLang="en-US" smtClean="0"/>
-              <a:t>2023/1/6</a:t>
+              <a:t>2023/1/7</a:t>
             </a:fld>
             <a:endParaRPr kumimoji="1" lang="ja-JP" altLang="en-US"/>
           </a:p>
@@ -2931,7 +2931,7 @@
           <a:p>
             <a:fld id="{E367C172-55BE-4236-9969-D03914048A1F}" type="datetimeFigureOut">
               <a:rPr kumimoji="1" lang="ja-JP" altLang="en-US" smtClean="0"/>
-              <a:t>2023/1/6</a:t>
+              <a:t>2023/1/7</a:t>
             </a:fld>
             <a:endParaRPr kumimoji="1" lang="ja-JP" altLang="en-US"/>
           </a:p>
@@ -3348,36 +3348,218 @@
           <a:chExt cx="0" cy="0"/>
         </a:xfrm>
       </p:grpSpPr>
-      <p:pic>
-        <p:nvPicPr>
-          <p:cNvPr id="5" name="Picture 4">
-            <a:extLst>
-              <a:ext uri="{FF2B5EF4-FFF2-40B4-BE49-F238E27FC236}">
-                <a16:creationId xmlns:a16="http://schemas.microsoft.com/office/drawing/2014/main" id="{0038CE13-ECA2-4883-ADC2-295CB157BFD9}"/>
-              </a:ext>
-            </a:extLst>
-          </p:cNvPr>
-          <p:cNvPicPr>
-            <a:picLocks noChangeAspect="1"/>
-          </p:cNvPicPr>
+      <p:sp>
+        <p:nvSpPr>
+          <p:cNvPr id="2" name="TextBox 1">
+            <a:extLst>
+              <a:ext uri="{FF2B5EF4-FFF2-40B4-BE49-F238E27FC236}">
+                <a16:creationId xmlns:a16="http://schemas.microsoft.com/office/drawing/2014/main" id="{90E510D7-7573-4E30-BCB9-BC8042E262FD}"/>
+              </a:ext>
+            </a:extLst>
+          </p:cNvPr>
+          <p:cNvSpPr txBox="1"/>
           <p:nvPr/>
-        </p:nvPicPr>
-        <p:blipFill>
-          <a:blip r:embed="rId2"/>
-          <a:stretch>
-            <a:fillRect/>
-          </a:stretch>
-        </p:blipFill>
+        </p:nvSpPr>
         <p:spPr>
           <a:xfrm>
-            <a:off x="3435673" y="1362112"/>
-            <a:ext cx="4648849" cy="3648584"/>
+            <a:off x="482406" y="1269560"/>
+            <a:ext cx="10525638" cy="923330"/>
           </a:xfrm>
           <a:prstGeom prst="rect">
             <a:avLst/>
           </a:prstGeom>
+          <a:noFill/>
         </p:spPr>
-      </p:pic>
+        <p:txBody>
+          <a:bodyPr wrap="none" rtlCol="0">
+            <a:spAutoFit/>
+          </a:bodyPr>
+          <a:lstStyle/>
+          <a:p>
+            <a:r>
+              <a:rPr kumimoji="1" lang="en-US" altLang="ja-JP" b="1" dirty="0" err="1"/>
+              <a:t>Các</a:t>
+            </a:r>
+            <a:r>
+              <a:rPr kumimoji="1" lang="en-US" altLang="ja-JP" b="1" dirty="0"/>
+              <a:t> </a:t>
+            </a:r>
+            <a:r>
+              <a:rPr kumimoji="1" lang="en-US" altLang="ja-JP" b="1" dirty="0" err="1"/>
+              <a:t>tính</a:t>
+            </a:r>
+            <a:r>
+              <a:rPr kumimoji="1" lang="en-US" altLang="ja-JP" b="1" dirty="0"/>
+              <a:t> </a:t>
+            </a:r>
+            <a:r>
+              <a:rPr kumimoji="1" lang="en-US" altLang="ja-JP" b="1" dirty="0" err="1"/>
+              <a:t>năng</a:t>
+            </a:r>
+            <a:endParaRPr kumimoji="1" lang="en-US" altLang="ja-JP" b="1" dirty="0"/>
+          </a:p>
+          <a:p>
+            <a:r>
+              <a:rPr kumimoji="1" lang="ja-JP" altLang="en-US" dirty="0"/>
+              <a:t>・</a:t>
+            </a:r>
+            <a:r>
+              <a:rPr kumimoji="1" lang="en-US" altLang="ja-JP" dirty="0"/>
+              <a:t>Load xml settin</a:t>
+            </a:r>
+            <a:r>
+              <a:rPr lang="en-US" altLang="ja-JP" dirty="0"/>
+              <a:t>g file </a:t>
+            </a:r>
+            <a:r>
+              <a:rPr lang="en-US" altLang="ja-JP" dirty="0" err="1"/>
+              <a:t>khi</a:t>
+            </a:r>
+            <a:r>
+              <a:rPr lang="en-US" altLang="ja-JP" dirty="0"/>
+              <a:t> </a:t>
+            </a:r>
+            <a:r>
+              <a:rPr lang="en-US" altLang="ja-JP" dirty="0" err="1"/>
+              <a:t>khởi</a:t>
+            </a:r>
+            <a:r>
+              <a:rPr lang="en-US" altLang="ja-JP" dirty="0"/>
+              <a:t> </a:t>
+            </a:r>
+            <a:r>
+              <a:rPr lang="en-US" altLang="ja-JP" dirty="0" err="1"/>
+              <a:t>chạy</a:t>
+            </a:r>
+            <a:r>
+              <a:rPr lang="en-US" altLang="ja-JP" dirty="0"/>
+              <a:t> </a:t>
+            </a:r>
+            <a:r>
+              <a:rPr lang="en-US" altLang="ja-JP" dirty="0" err="1"/>
+              <a:t>chương</a:t>
+            </a:r>
+            <a:r>
+              <a:rPr lang="en-US" altLang="ja-JP" dirty="0"/>
+              <a:t> </a:t>
+            </a:r>
+            <a:r>
+              <a:rPr lang="en-US" altLang="ja-JP" dirty="0" err="1"/>
+              <a:t>trình</a:t>
+            </a:r>
+            <a:r>
+              <a:rPr lang="ja-JP" altLang="en-US" dirty="0"/>
+              <a:t> </a:t>
+            </a:r>
+            <a:r>
+              <a:rPr lang="en-US" altLang="ja-JP" dirty="0" err="1"/>
+              <a:t>hoặc</a:t>
+            </a:r>
+            <a:r>
+              <a:rPr lang="en-US" altLang="ja-JP" dirty="0"/>
+              <a:t> </a:t>
+            </a:r>
+            <a:r>
+              <a:rPr lang="en-US" altLang="ja-JP" dirty="0" err="1"/>
+              <a:t>bấm</a:t>
+            </a:r>
+            <a:r>
+              <a:rPr lang="en-US" altLang="ja-JP" dirty="0"/>
+              <a:t> </a:t>
+            </a:r>
+            <a:r>
+              <a:rPr lang="en-US" altLang="ja-JP" dirty="0" err="1"/>
+              <a:t>nút</a:t>
+            </a:r>
+            <a:r>
+              <a:rPr lang="en-US" altLang="ja-JP" dirty="0"/>
+              <a:t> LOAD, </a:t>
+            </a:r>
+            <a:r>
+              <a:rPr lang="en-US" altLang="ja-JP" dirty="0" err="1"/>
+              <a:t>sau</a:t>
+            </a:r>
+            <a:r>
+              <a:rPr lang="en-US" altLang="ja-JP" dirty="0"/>
+              <a:t> </a:t>
+            </a:r>
+            <a:r>
+              <a:rPr lang="en-US" altLang="ja-JP" dirty="0" err="1"/>
+              <a:t>đó</a:t>
+            </a:r>
+            <a:r>
+              <a:rPr lang="en-US" altLang="ja-JP" dirty="0"/>
+              <a:t> </a:t>
+            </a:r>
+            <a:r>
+              <a:rPr lang="en-US" altLang="ja-JP" dirty="0" err="1"/>
+              <a:t>hiển</a:t>
+            </a:r>
+            <a:r>
+              <a:rPr lang="en-US" altLang="ja-JP" dirty="0"/>
+              <a:t> </a:t>
+            </a:r>
+            <a:r>
+              <a:rPr lang="en-US" altLang="ja-JP" dirty="0" err="1"/>
+              <a:t>thị</a:t>
+            </a:r>
+            <a:r>
+              <a:rPr lang="en-US" altLang="ja-JP" dirty="0"/>
+              <a:t> </a:t>
+            </a:r>
+            <a:r>
+              <a:rPr lang="en-US" altLang="ja-JP" dirty="0" err="1"/>
+              <a:t>lên</a:t>
+            </a:r>
+            <a:r>
+              <a:rPr lang="en-US" altLang="ja-JP" dirty="0"/>
+              <a:t> textbox</a:t>
+            </a:r>
+          </a:p>
+          <a:p>
+            <a:r>
+              <a:rPr lang="ja-JP" altLang="en-US" dirty="0"/>
+              <a:t>・</a:t>
+            </a:r>
+            <a:r>
+              <a:rPr lang="en-US" altLang="ja-JP" dirty="0"/>
+              <a:t>Save </a:t>
+            </a:r>
+            <a:r>
+              <a:rPr lang="en-US" altLang="ja-JP" dirty="0" err="1"/>
+              <a:t>dữ</a:t>
+            </a:r>
+            <a:r>
+              <a:rPr lang="en-US" altLang="ja-JP" dirty="0"/>
+              <a:t> </a:t>
+            </a:r>
+            <a:r>
+              <a:rPr lang="en-US" altLang="ja-JP" dirty="0" err="1"/>
+              <a:t>liệu</a:t>
+            </a:r>
+            <a:r>
+              <a:rPr lang="en-US" altLang="ja-JP" dirty="0"/>
+              <a:t> </a:t>
+            </a:r>
+            <a:r>
+              <a:rPr lang="en-US" altLang="ja-JP" dirty="0" err="1"/>
+              <a:t>trên</a:t>
+            </a:r>
+            <a:r>
+              <a:rPr lang="en-US" altLang="ja-JP" dirty="0"/>
+              <a:t> textbox </a:t>
+            </a:r>
+            <a:r>
+              <a:rPr lang="en-US" altLang="ja-JP" dirty="0" err="1"/>
+              <a:t>để</a:t>
+            </a:r>
+            <a:r>
+              <a:rPr lang="en-US" altLang="ja-JP" dirty="0"/>
+              <a:t> update xml file</a:t>
+            </a:r>
+          </a:p>
+        </p:txBody>
+      </p:sp>
     </p:spTree>
     <p:extLst>
       <p:ext uri="{BB962C8B-B14F-4D97-AF65-F5344CB8AC3E}">
@@ -3517,7 +3699,7 @@
         <p:spPr>
           <a:xfrm>
             <a:off x="184558" y="906011"/>
-            <a:ext cx="8574783" cy="369332"/>
+            <a:ext cx="8770350" cy="1200329"/>
           </a:xfrm>
           <a:prstGeom prst="rect">
             <a:avLst/>
@@ -3566,6 +3748,186 @@
               </a:rPr>
               <a:t>) | Microsoft Learn</a:t>
             </a:r>
+            <a:endParaRPr lang="en-US" altLang="ja-JP" dirty="0"/>
+          </a:p>
+          <a:p>
+            <a:r>
+              <a:rPr kumimoji="1" lang="en-US" altLang="ja-JP" dirty="0" err="1"/>
+              <a:t>Su</a:t>
+            </a:r>
+            <a:r>
+              <a:rPr kumimoji="1" lang="en-US" altLang="ja-JP" dirty="0"/>
+              <a:t> dung using </a:t>
+            </a:r>
+            <a:r>
+              <a:rPr kumimoji="1" lang="en-US" altLang="ja-JP" dirty="0" err="1"/>
+              <a:t>để</a:t>
+            </a:r>
+            <a:r>
+              <a:rPr kumimoji="1" lang="en-US" altLang="ja-JP" dirty="0"/>
+              <a:t> </a:t>
+            </a:r>
+            <a:r>
+              <a:rPr kumimoji="1" lang="en-US" altLang="ja-JP" dirty="0" err="1"/>
+              <a:t>giải</a:t>
+            </a:r>
+            <a:r>
+              <a:rPr kumimoji="1" lang="en-US" altLang="ja-JP" dirty="0"/>
+              <a:t> </a:t>
+            </a:r>
+            <a:r>
+              <a:rPr kumimoji="1" lang="en-US" altLang="ja-JP" dirty="0" err="1"/>
+              <a:t>phóng</a:t>
+            </a:r>
+            <a:r>
+              <a:rPr kumimoji="1" lang="en-US" altLang="ja-JP" dirty="0"/>
+              <a:t> </a:t>
+            </a:r>
+            <a:r>
+              <a:rPr kumimoji="1" lang="en-US" altLang="ja-JP" dirty="0" err="1"/>
+              <a:t>tài</a:t>
+            </a:r>
+            <a:r>
+              <a:rPr kumimoji="1" lang="en-US" altLang="ja-JP" dirty="0"/>
+              <a:t> Nguyen </a:t>
+            </a:r>
+            <a:r>
+              <a:rPr kumimoji="1" lang="en-US" altLang="ja-JP" dirty="0" err="1"/>
+              <a:t>đối</a:t>
+            </a:r>
+            <a:r>
+              <a:rPr kumimoji="1" lang="en-US" altLang="ja-JP" dirty="0"/>
+              <a:t> </a:t>
+            </a:r>
+            <a:r>
+              <a:rPr kumimoji="1" lang="en-US" altLang="ja-JP" dirty="0" err="1"/>
+              <a:t>với</a:t>
+            </a:r>
+            <a:r>
+              <a:rPr kumimoji="1" lang="en-US" altLang="ja-JP" dirty="0"/>
+              <a:t> 1 </a:t>
+            </a:r>
+            <a:r>
+              <a:rPr kumimoji="1" lang="en-US" altLang="ja-JP" dirty="0" err="1"/>
+              <a:t>số</a:t>
+            </a:r>
+            <a:r>
+              <a:rPr kumimoji="1" lang="en-US" altLang="ja-JP" dirty="0"/>
+              <a:t> TH :</a:t>
+            </a:r>
+          </a:p>
+          <a:p>
+            <a:r>
+              <a:rPr lang="en-US" altLang="ja-JP" dirty="0" err="1">
+                <a:hlinkClick r:id="rId3"/>
+              </a:rPr>
+              <a:t>Sử</a:t>
+            </a:r>
+            <a:r>
+              <a:rPr lang="en-US" altLang="ja-JP" dirty="0">
+                <a:hlinkClick r:id="rId3"/>
+              </a:rPr>
+              <a:t> </a:t>
+            </a:r>
+            <a:r>
+              <a:rPr lang="en-US" altLang="ja-JP" dirty="0" err="1">
+                <a:hlinkClick r:id="rId3"/>
+              </a:rPr>
+              <a:t>dụng</a:t>
+            </a:r>
+            <a:r>
+              <a:rPr lang="en-US" altLang="ja-JP" dirty="0">
+                <a:hlinkClick r:id="rId3"/>
+              </a:rPr>
+              <a:t> </a:t>
+            </a:r>
+            <a:r>
+              <a:rPr lang="en-US" altLang="ja-JP" dirty="0" err="1">
+                <a:hlinkClick r:id="rId3"/>
+              </a:rPr>
+              <a:t>giao</a:t>
+            </a:r>
+            <a:r>
+              <a:rPr lang="en-US" altLang="ja-JP" dirty="0">
+                <a:hlinkClick r:id="rId3"/>
+              </a:rPr>
+              <a:t> </a:t>
+            </a:r>
+            <a:r>
+              <a:rPr lang="en-US" altLang="ja-JP" dirty="0" err="1">
+                <a:hlinkClick r:id="rId3"/>
+              </a:rPr>
+              <a:t>diện</a:t>
+            </a:r>
+            <a:r>
+              <a:rPr lang="en-US" altLang="ja-JP" dirty="0">
+                <a:hlinkClick r:id="rId3"/>
+              </a:rPr>
+              <a:t> </a:t>
+            </a:r>
+            <a:r>
+              <a:rPr lang="en-US" altLang="ja-JP" dirty="0" err="1">
+                <a:hlinkClick r:id="rId3"/>
+              </a:rPr>
+              <a:t>IDisposable</a:t>
+            </a:r>
+            <a:r>
+              <a:rPr lang="en-US" altLang="ja-JP" dirty="0">
+                <a:hlinkClick r:id="rId3"/>
+              </a:rPr>
+              <a:t> </a:t>
+            </a:r>
+            <a:r>
+              <a:rPr lang="en-US" altLang="ja-JP" dirty="0" err="1">
+                <a:hlinkClick r:id="rId3"/>
+              </a:rPr>
+              <a:t>và</a:t>
+            </a:r>
+            <a:r>
+              <a:rPr lang="en-US" altLang="ja-JP" dirty="0">
+                <a:hlinkClick r:id="rId3"/>
+              </a:rPr>
+              <a:t> </a:t>
+            </a:r>
+            <a:r>
+              <a:rPr lang="en-US" altLang="ja-JP" dirty="0" err="1">
+                <a:hlinkClick r:id="rId3"/>
+              </a:rPr>
+              <a:t>từ</a:t>
+            </a:r>
+            <a:r>
+              <a:rPr lang="en-US" altLang="ja-JP" dirty="0">
+                <a:hlinkClick r:id="rId3"/>
+              </a:rPr>
+              <a:t> </a:t>
+            </a:r>
+            <a:r>
+              <a:rPr lang="en-US" altLang="ja-JP" dirty="0" err="1">
+                <a:hlinkClick r:id="rId3"/>
+              </a:rPr>
+              <a:t>khóa</a:t>
+            </a:r>
+            <a:r>
+              <a:rPr lang="en-US" altLang="ja-JP" dirty="0">
+                <a:hlinkClick r:id="rId3"/>
+              </a:rPr>
+              <a:t> using </a:t>
+            </a:r>
+            <a:r>
+              <a:rPr lang="en-US" altLang="ja-JP" dirty="0" err="1">
+                <a:hlinkClick r:id="rId3"/>
+              </a:rPr>
+              <a:t>trong</a:t>
+            </a:r>
+            <a:r>
+              <a:rPr lang="en-US" altLang="ja-JP" dirty="0">
+                <a:hlinkClick r:id="rId3"/>
+              </a:rPr>
+              <a:t> C # Sharp (xuanthulab.net)</a:t>
+            </a:r>
+            <a:endParaRPr lang="en-US" altLang="ja-JP" dirty="0"/>
+          </a:p>
+          <a:p>
             <a:endParaRPr kumimoji="1" lang="ja-JP" altLang="en-US" dirty="0"/>
           </a:p>
         </p:txBody>

</xml_diff>